<commit_message>
fix presentatino and tests
</commit_message>
<xml_diff>
--- a/presentations/SPG_spint2_presentation.pptx
+++ b/presentations/SPG_spint2_presentation.pptx
@@ -5235,7 +5235,7 @@
             <a:pPr algn="ctr"/>
             <a:r>
               <a:rPr lang="en-GB" dirty="0"/>
-              <a:t>STORY 6</a:t>
+              <a:t>STORY 11</a:t>
             </a:r>
           </a:p>
         </p:txBody>
@@ -5680,7 +5680,7 @@
             <a:pPr algn="ctr"/>
             <a:r>
               <a:rPr lang="en-GB" dirty="0"/>
-              <a:t>STORY 7</a:t>
+              <a:t>STORY 12</a:t>
             </a:r>
           </a:p>
         </p:txBody>
@@ -6843,7 +6843,7 @@
             <a:pPr algn="ctr"/>
             <a:r>
               <a:rPr lang="en-GB" dirty="0"/>
-              <a:t>STORY 1</a:t>
+              <a:t>STORY 6</a:t>
             </a:r>
           </a:p>
         </p:txBody>
@@ -7055,7 +7055,7 @@
             <a:pPr algn="ctr"/>
             <a:r>
               <a:rPr lang="en-GB" dirty="0"/>
-              <a:t>STORY 2</a:t>
+              <a:t>STORY 7</a:t>
             </a:r>
           </a:p>
         </p:txBody>
@@ -7277,7 +7277,7 @@
             <a:pPr algn="ctr"/>
             <a:r>
               <a:rPr lang="en-GB" dirty="0"/>
-              <a:t>STORY 3</a:t>
+              <a:t>STORY 8</a:t>
             </a:r>
           </a:p>
         </p:txBody>
@@ -7493,7 +7493,7 @@
             <a:pPr algn="ctr"/>
             <a:r>
               <a:rPr lang="en-GB" dirty="0"/>
-              <a:t>STORY 4</a:t>
+              <a:t>STORY 9</a:t>
             </a:r>
           </a:p>
         </p:txBody>
@@ -7956,7 +7956,7 @@
             <a:pPr algn="ctr"/>
             <a:r>
               <a:rPr lang="en-GB" dirty="0"/>
-              <a:t>STORY 5</a:t>
+              <a:t>STORY 10</a:t>
             </a:r>
           </a:p>
         </p:txBody>

</xml_diff>